<commit_message>
Updated Thread Java Classes
</commit_message>
<xml_diff>
--- a/Notes/Core_Java.pptx
+++ b/Notes/Core_Java.pptx
@@ -209,6 +209,11 @@
     <p:sldId id="460" r:id="rId203"/>
     <p:sldId id="455" r:id="rId204"/>
     <p:sldId id="456" r:id="rId205"/>
+    <p:sldId id="461" r:id="rId206"/>
+    <p:sldId id="462" r:id="rId207"/>
+    <p:sldId id="463" r:id="rId208"/>
+    <p:sldId id="464" r:id="rId209"/>
+    <p:sldId id="465" r:id="rId210"/>
   </p:sldIdLst>
   <p:sldSz cx="12192000" cy="6858000"/>
   <p:notesSz cx="6858000" cy="9144000"/>
@@ -29130,6 +29135,761 @@
 </p:sld>
 </file>
 
+<file path=ppt/slides/slide205.xml><?xml version="1.0" encoding="utf-8"?>
+<p:sld xmlns:a="http://schemas.openxmlformats.org/drawingml/2006/main" xmlns:r="http://schemas.openxmlformats.org/officeDocument/2006/relationships" xmlns:p="http://schemas.openxmlformats.org/presentationml/2006/main">
+  <p:cSld>
+    <p:spTree>
+      <p:nvGrpSpPr>
+        <p:cNvPr id="1" name=""/>
+        <p:cNvGrpSpPr/>
+        <p:nvPr/>
+      </p:nvGrpSpPr>
+      <p:grpSpPr>
+        <a:xfrm>
+          <a:off x="0" y="0"/>
+          <a:ext cx="0" cy="0"/>
+          <a:chOff x="0" y="0"/>
+          <a:chExt cx="0" cy="0"/>
+        </a:xfrm>
+      </p:grpSpPr>
+      <p:sp>
+        <p:nvSpPr>
+          <p:cNvPr id="2" name="Title 1">
+            <a:extLst>
+              <a:ext uri="{FF2B5EF4-FFF2-40B4-BE49-F238E27FC236}">
+                <a16:creationId xmlns:a16="http://schemas.microsoft.com/office/drawing/2014/main" id="{641F6B97-2EEE-E514-5528-01F552841F83}"/>
+              </a:ext>
+            </a:extLst>
+          </p:cNvPr>
+          <p:cNvSpPr>
+            <a:spLocks noGrp="1"/>
+          </p:cNvSpPr>
+          <p:nvPr>
+            <p:ph type="title"/>
+          </p:nvPr>
+        </p:nvSpPr>
+        <p:spPr/>
+        <p:txBody>
+          <a:bodyPr/>
+          <a:lstStyle/>
+          <a:p>
+            <a:r>
+              <a:rPr lang="en-IN" b="0" i="0" u="none" strike="noStrike" dirty="0">
+                <a:solidFill>
+                  <a:srgbClr val="212529"/>
+                </a:solidFill>
+                <a:effectLst/>
+                <a:latin typeface="Ubuntu" panose="020B0504030602030204" pitchFamily="34" charset="0"/>
+              </a:rPr>
+              <a:t>Deadlock</a:t>
+            </a:r>
+            <a:endParaRPr lang="en-US" dirty="0"/>
+          </a:p>
+        </p:txBody>
+      </p:sp>
+      <p:sp>
+        <p:nvSpPr>
+          <p:cNvPr id="3" name="Content Placeholder 2">
+            <a:extLst>
+              <a:ext uri="{FF2B5EF4-FFF2-40B4-BE49-F238E27FC236}">
+                <a16:creationId xmlns:a16="http://schemas.microsoft.com/office/drawing/2014/main" id="{52E85C20-0542-E801-83E6-A6F81D6AE9B6}"/>
+              </a:ext>
+            </a:extLst>
+          </p:cNvPr>
+          <p:cNvSpPr>
+            <a:spLocks noGrp="1"/>
+          </p:cNvSpPr>
+          <p:nvPr>
+            <p:ph idx="1"/>
+          </p:nvPr>
+        </p:nvSpPr>
+        <p:spPr/>
+        <p:txBody>
+          <a:bodyPr/>
+          <a:lstStyle/>
+          <a:p>
+            <a:r>
+              <a:rPr lang="en-IN" dirty="0"/>
+              <a:t>Deadlock</a:t>
+            </a:r>
+            <a:r>
+              <a:rPr lang="en-IN" b="0" i="0" u="none" strike="noStrike" dirty="0">
+                <a:solidFill>
+                  <a:srgbClr val="212529"/>
+                </a:solidFill>
+                <a:effectLst/>
+                <a:highlight>
+                  <a:srgbClr val="FFFFFF"/>
+                </a:highlight>
+                <a:latin typeface="Ubuntu" panose="020B0504030602030204" pitchFamily="34" charset="0"/>
+              </a:rPr>
+              <a:t> describes a situation where two or more threads are blocked forever, waiting for each other. </a:t>
+            </a:r>
+          </a:p>
+          <a:p>
+            <a:r>
+              <a:rPr lang="en-IN" b="0" i="0" u="none" strike="noStrike" dirty="0">
+                <a:solidFill>
+                  <a:srgbClr val="212529"/>
+                </a:solidFill>
+                <a:effectLst/>
+                <a:highlight>
+                  <a:srgbClr val="FFFFFF"/>
+                </a:highlight>
+                <a:latin typeface="Ubuntu" panose="020B0504030602030204" pitchFamily="34" charset="0"/>
+              </a:rPr>
+              <a:t>Deadlock occurs when multiple threads need the same locks but obtain them in different order. </a:t>
+            </a:r>
+          </a:p>
+          <a:p>
+            <a:r>
+              <a:rPr lang="en-IN" b="0" i="0" u="none" strike="noStrike" dirty="0">
+                <a:solidFill>
+                  <a:srgbClr val="212529"/>
+                </a:solidFill>
+                <a:effectLst/>
+                <a:highlight>
+                  <a:srgbClr val="FFFFFF"/>
+                </a:highlight>
+                <a:latin typeface="Ubuntu" panose="020B0504030602030204" pitchFamily="34" charset="0"/>
+              </a:rPr>
+              <a:t>A Java multithreaded program may suffer from the deadlock condition because the synchronized keyword causes the executing thread to block while waiting for the lock, or monitor, associated with the specified object.</a:t>
+            </a:r>
+            <a:endParaRPr lang="en-US" dirty="0"/>
+          </a:p>
+        </p:txBody>
+      </p:sp>
+    </p:spTree>
+    <p:extLst>
+      <p:ext uri="{BB962C8B-B14F-4D97-AF65-F5344CB8AC3E}">
+        <p14:creationId xmlns:p14="http://schemas.microsoft.com/office/powerpoint/2010/main" val="2173216404"/>
+      </p:ext>
+    </p:extLst>
+  </p:cSld>
+  <p:clrMapOvr>
+    <a:masterClrMapping/>
+  </p:clrMapOvr>
+</p:sld>
+</file>
+
+<file path=ppt/slides/slide206.xml><?xml version="1.0" encoding="utf-8"?>
+<p:sld xmlns:a="http://schemas.openxmlformats.org/drawingml/2006/main" xmlns:r="http://schemas.openxmlformats.org/officeDocument/2006/relationships" xmlns:p="http://schemas.openxmlformats.org/presentationml/2006/main">
+  <p:cSld>
+    <p:spTree>
+      <p:nvGrpSpPr>
+        <p:cNvPr id="1" name=""/>
+        <p:cNvGrpSpPr/>
+        <p:nvPr/>
+      </p:nvGrpSpPr>
+      <p:grpSpPr>
+        <a:xfrm>
+          <a:off x="0" y="0"/>
+          <a:ext cx="0" cy="0"/>
+          <a:chOff x="0" y="0"/>
+          <a:chExt cx="0" cy="0"/>
+        </a:xfrm>
+      </p:grpSpPr>
+      <p:pic>
+        <p:nvPicPr>
+          <p:cNvPr id="4" name="Content Placeholder 3">
+            <a:extLst>
+              <a:ext uri="{FF2B5EF4-FFF2-40B4-BE49-F238E27FC236}">
+                <a16:creationId xmlns:a16="http://schemas.microsoft.com/office/drawing/2014/main" id="{244DBEF4-C28C-8547-FC42-90D97EC5E770}"/>
+              </a:ext>
+            </a:extLst>
+          </p:cNvPr>
+          <p:cNvPicPr>
+            <a:picLocks noGrp="1" noChangeAspect="1"/>
+          </p:cNvPicPr>
+          <p:nvPr>
+            <p:ph idx="1"/>
+          </p:nvPr>
+        </p:nvPicPr>
+        <p:blipFill>
+          <a:blip r:embed="rId2"/>
+          <a:stretch>
+            <a:fillRect/>
+          </a:stretch>
+        </p:blipFill>
+        <p:spPr>
+          <a:xfrm>
+            <a:off x="2149434" y="629392"/>
+            <a:ext cx="7635834" cy="5547571"/>
+          </a:xfrm>
+          <a:prstGeom prst="rect">
+            <a:avLst/>
+          </a:prstGeom>
+        </p:spPr>
+      </p:pic>
+    </p:spTree>
+    <p:extLst>
+      <p:ext uri="{BB962C8B-B14F-4D97-AF65-F5344CB8AC3E}">
+        <p14:creationId xmlns:p14="http://schemas.microsoft.com/office/powerpoint/2010/main" val="1512372043"/>
+      </p:ext>
+    </p:extLst>
+  </p:cSld>
+  <p:clrMapOvr>
+    <a:masterClrMapping/>
+  </p:clrMapOvr>
+</p:sld>
+</file>
+
+<file path=ppt/slides/slide207.xml><?xml version="1.0" encoding="utf-8"?>
+<p:sld xmlns:a="http://schemas.openxmlformats.org/drawingml/2006/main" xmlns:r="http://schemas.openxmlformats.org/officeDocument/2006/relationships" xmlns:p="http://schemas.openxmlformats.org/presentationml/2006/main">
+  <p:cSld>
+    <p:spTree>
+      <p:nvGrpSpPr>
+        <p:cNvPr id="1" name=""/>
+        <p:cNvGrpSpPr/>
+        <p:nvPr/>
+      </p:nvGrpSpPr>
+      <p:grpSpPr>
+        <a:xfrm>
+          <a:off x="0" y="0"/>
+          <a:ext cx="0" cy="0"/>
+          <a:chOff x="0" y="0"/>
+          <a:chExt cx="0" cy="0"/>
+        </a:xfrm>
+      </p:grpSpPr>
+      <p:sp>
+        <p:nvSpPr>
+          <p:cNvPr id="2" name="Title 1">
+            <a:extLst>
+              <a:ext uri="{FF2B5EF4-FFF2-40B4-BE49-F238E27FC236}">
+                <a16:creationId xmlns:a16="http://schemas.microsoft.com/office/drawing/2014/main" id="{4210D650-613B-BF45-DED8-2E835224F83D}"/>
+              </a:ext>
+            </a:extLst>
+          </p:cNvPr>
+          <p:cNvSpPr>
+            <a:spLocks noGrp="1"/>
+          </p:cNvSpPr>
+          <p:nvPr>
+            <p:ph type="title"/>
+          </p:nvPr>
+        </p:nvSpPr>
+        <p:spPr/>
+        <p:txBody>
+          <a:bodyPr/>
+          <a:lstStyle/>
+          <a:p>
+            <a:r>
+              <a:rPr lang="en-US" dirty="0" err="1"/>
+              <a:t>DeadLock</a:t>
+            </a:r>
+            <a:r>
+              <a:rPr lang="en-US" dirty="0"/>
+              <a:t> Detection</a:t>
+            </a:r>
+          </a:p>
+        </p:txBody>
+      </p:sp>
+      <p:sp>
+        <p:nvSpPr>
+          <p:cNvPr id="3" name="Content Placeholder 2">
+            <a:extLst>
+              <a:ext uri="{FF2B5EF4-FFF2-40B4-BE49-F238E27FC236}">
+                <a16:creationId xmlns:a16="http://schemas.microsoft.com/office/drawing/2014/main" id="{D41F9B08-2443-7A9F-F406-3DCDAC064A16}"/>
+              </a:ext>
+            </a:extLst>
+          </p:cNvPr>
+          <p:cNvSpPr>
+            <a:spLocks noGrp="1"/>
+          </p:cNvSpPr>
+          <p:nvPr>
+            <p:ph idx="1"/>
+          </p:nvPr>
+        </p:nvSpPr>
+        <p:spPr/>
+        <p:txBody>
+          <a:bodyPr/>
+          <a:lstStyle/>
+          <a:p>
+            <a:r>
+              <a:rPr lang="en-IN" b="0" i="0" u="none" strike="noStrike" dirty="0">
+                <a:solidFill>
+                  <a:srgbClr val="212529"/>
+                </a:solidFill>
+                <a:effectLst/>
+                <a:highlight>
+                  <a:srgbClr val="FFFFFF"/>
+                </a:highlight>
+                <a:latin typeface="Ubuntu" panose="020B0504030602030204" pitchFamily="34" charset="0"/>
+              </a:rPr>
+              <a:t>Deadlock can be very hard to detect during development, and you may have to restart the application in order to recover. It also happens in production environment, which causes severe consequences. Such issue is very hard to spot during testing, and is very difficult to reproduce it locally.</a:t>
+            </a:r>
+            <a:endParaRPr lang="en-US" dirty="0"/>
+          </a:p>
+        </p:txBody>
+      </p:sp>
+    </p:spTree>
+    <p:extLst>
+      <p:ext uri="{BB962C8B-B14F-4D97-AF65-F5344CB8AC3E}">
+        <p14:creationId xmlns:p14="http://schemas.microsoft.com/office/powerpoint/2010/main" val="837174274"/>
+      </p:ext>
+    </p:extLst>
+  </p:cSld>
+  <p:clrMapOvr>
+    <a:masterClrMapping/>
+  </p:clrMapOvr>
+</p:sld>
+</file>
+
+<file path=ppt/slides/slide208.xml><?xml version="1.0" encoding="utf-8"?>
+<p:sld xmlns:a="http://schemas.openxmlformats.org/drawingml/2006/main" xmlns:r="http://schemas.openxmlformats.org/officeDocument/2006/relationships" xmlns:p="http://schemas.openxmlformats.org/presentationml/2006/main">
+  <p:cSld>
+    <p:spTree>
+      <p:nvGrpSpPr>
+        <p:cNvPr id="1" name=""/>
+        <p:cNvGrpSpPr/>
+        <p:nvPr/>
+      </p:nvGrpSpPr>
+      <p:grpSpPr>
+        <a:xfrm>
+          <a:off x="0" y="0"/>
+          <a:ext cx="0" cy="0"/>
+          <a:chOff x="0" y="0"/>
+          <a:chExt cx="0" cy="0"/>
+        </a:xfrm>
+      </p:grpSpPr>
+      <p:sp>
+        <p:nvSpPr>
+          <p:cNvPr id="2" name="Title 1">
+            <a:extLst>
+              <a:ext uri="{FF2B5EF4-FFF2-40B4-BE49-F238E27FC236}">
+                <a16:creationId xmlns:a16="http://schemas.microsoft.com/office/drawing/2014/main" id="{9C204A37-7193-FD2E-2D9E-627DF21ADFB7}"/>
+              </a:ext>
+            </a:extLst>
+          </p:cNvPr>
+          <p:cNvSpPr>
+            <a:spLocks noGrp="1"/>
+          </p:cNvSpPr>
+          <p:nvPr>
+            <p:ph type="title"/>
+          </p:nvPr>
+        </p:nvSpPr>
+        <p:spPr/>
+        <p:txBody>
+          <a:bodyPr/>
+          <a:lstStyle/>
+          <a:p>
+            <a:r>
+              <a:rPr lang="en-IN" b="0" i="0" u="none" strike="noStrike" dirty="0">
+                <a:solidFill>
+                  <a:srgbClr val="212529"/>
+                </a:solidFill>
+                <a:effectLst/>
+                <a:latin typeface="Ubuntu" panose="020B0504030602030204" pitchFamily="34" charset="0"/>
+              </a:rPr>
+              <a:t>Detect Deadlock Programmatically</a:t>
+            </a:r>
+            <a:endParaRPr lang="en-US" dirty="0"/>
+          </a:p>
+        </p:txBody>
+      </p:sp>
+      <p:sp>
+        <p:nvSpPr>
+          <p:cNvPr id="3" name="Content Placeholder 2">
+            <a:extLst>
+              <a:ext uri="{FF2B5EF4-FFF2-40B4-BE49-F238E27FC236}">
+                <a16:creationId xmlns:a16="http://schemas.microsoft.com/office/drawing/2014/main" id="{4EBE4FF6-122A-ED9D-1CD8-C9667310E43F}"/>
+              </a:ext>
+            </a:extLst>
+          </p:cNvPr>
+          <p:cNvSpPr>
+            <a:spLocks noGrp="1"/>
+          </p:cNvSpPr>
+          <p:nvPr>
+            <p:ph idx="1"/>
+          </p:nvPr>
+        </p:nvSpPr>
+        <p:spPr/>
+        <p:txBody>
+          <a:bodyPr/>
+          <a:lstStyle/>
+          <a:p>
+            <a:r>
+              <a:rPr lang="en-IN" b="0" i="0" u="none" strike="noStrike" dirty="0">
+                <a:solidFill>
+                  <a:srgbClr val="212529"/>
+                </a:solidFill>
+                <a:effectLst/>
+                <a:highlight>
+                  <a:srgbClr val="FFFFFF"/>
+                </a:highlight>
+                <a:latin typeface="Ubuntu" panose="020B0504030602030204" pitchFamily="34" charset="0"/>
+              </a:rPr>
+              <a:t>Java 5 introduced </a:t>
+            </a:r>
+            <a:r>
+              <a:rPr lang="en-IN" b="0" i="0" u="none" strike="noStrike" dirty="0">
+                <a:solidFill>
+                  <a:srgbClr val="007BFF"/>
+                </a:solidFill>
+                <a:effectLst/>
+                <a:latin typeface="Ubuntu" panose="020B0504030602030204" pitchFamily="34" charset="0"/>
+                <a:hlinkClick r:id="rId2"/>
+              </a:rPr>
+              <a:t>ThreadMXBean</a:t>
+            </a:r>
+            <a:r>
+              <a:rPr lang="en-IN" b="0" i="0" u="none" strike="noStrike" dirty="0">
+                <a:solidFill>
+                  <a:srgbClr val="212529"/>
+                </a:solidFill>
+                <a:effectLst/>
+                <a:highlight>
+                  <a:srgbClr val="FFFFFF"/>
+                </a:highlight>
+                <a:latin typeface="Ubuntu" panose="020B0504030602030204" pitchFamily="34" charset="0"/>
+              </a:rPr>
+              <a:t> - an interface that provides various monitoring methods for threads. </a:t>
+            </a:r>
+          </a:p>
+          <a:p>
+            <a:r>
+              <a:rPr lang="en-IN" b="0" i="0" u="none" strike="noStrike" dirty="0">
+                <a:solidFill>
+                  <a:srgbClr val="212529"/>
+                </a:solidFill>
+                <a:effectLst/>
+                <a:highlight>
+                  <a:srgbClr val="FFFFFF"/>
+                </a:highlight>
+                <a:latin typeface="Ubuntu" panose="020B0504030602030204" pitchFamily="34" charset="0"/>
+              </a:rPr>
+              <a:t>There are many useful methods for monitoring the application performance. </a:t>
+            </a:r>
+          </a:p>
+          <a:p>
+            <a:r>
+              <a:rPr lang="en-IN" b="0" i="0" u="none" strike="noStrike" dirty="0">
+                <a:solidFill>
+                  <a:srgbClr val="212529"/>
+                </a:solidFill>
+                <a:effectLst/>
+                <a:highlight>
+                  <a:srgbClr val="FFFFFF"/>
+                </a:highlight>
+                <a:latin typeface="Ubuntu" panose="020B0504030602030204" pitchFamily="34" charset="0"/>
+              </a:rPr>
+              <a:t>The method of our interest is </a:t>
+            </a:r>
+            <a:r>
+              <a:rPr lang="en-IN" dirty="0" err="1"/>
+              <a:t>findMonitorDeadlockedThreads</a:t>
+            </a:r>
+            <a:r>
+              <a:rPr lang="en-IN" b="0" i="0" u="none" strike="noStrike" dirty="0">
+                <a:solidFill>
+                  <a:srgbClr val="212529"/>
+                </a:solidFill>
+                <a:effectLst/>
+                <a:highlight>
+                  <a:srgbClr val="FFFFFF"/>
+                </a:highlight>
+                <a:latin typeface="Ubuntu" panose="020B0504030602030204" pitchFamily="34" charset="0"/>
+              </a:rPr>
+              <a:t>, or, if you are using Java 6,</a:t>
+            </a:r>
+            <a:r>
+              <a:rPr lang="en-IN" dirty="0"/>
+              <a:t>findDeadlockedThreads</a:t>
+            </a:r>
+            <a:r>
+              <a:rPr lang="en-IN" b="0" i="0" u="none" strike="noStrike" dirty="0">
+                <a:solidFill>
+                  <a:srgbClr val="212529"/>
+                </a:solidFill>
+                <a:effectLst/>
+                <a:highlight>
+                  <a:srgbClr val="FFFFFF"/>
+                </a:highlight>
+                <a:latin typeface="Ubuntu" panose="020B0504030602030204" pitchFamily="34" charset="0"/>
+              </a:rPr>
+              <a:t>. </a:t>
+            </a:r>
+          </a:p>
+          <a:p>
+            <a:r>
+              <a:rPr lang="en-IN" b="0" i="0" u="none" strike="noStrike" dirty="0">
+                <a:solidFill>
+                  <a:srgbClr val="212529"/>
+                </a:solidFill>
+                <a:effectLst/>
+                <a:highlight>
+                  <a:srgbClr val="FFFFFF"/>
+                </a:highlight>
+                <a:latin typeface="Ubuntu" panose="020B0504030602030204" pitchFamily="34" charset="0"/>
+              </a:rPr>
+              <a:t>The difference is that </a:t>
+            </a:r>
+            <a:r>
+              <a:rPr lang="en-IN" b="0" i="0" u="none" strike="noStrike" dirty="0" err="1">
+                <a:solidFill>
+                  <a:srgbClr val="212529"/>
+                </a:solidFill>
+                <a:effectLst/>
+                <a:highlight>
+                  <a:srgbClr val="FFFFFF"/>
+                </a:highlight>
+                <a:latin typeface="Ubuntu" panose="020B0504030602030204" pitchFamily="34" charset="0"/>
+              </a:rPr>
+              <a:t>findDeadlockedThreads</a:t>
+            </a:r>
+            <a:r>
+              <a:rPr lang="en-IN" b="0" i="0" u="none" strike="noStrike" dirty="0">
+                <a:solidFill>
+                  <a:srgbClr val="212529"/>
+                </a:solidFill>
+                <a:effectLst/>
+                <a:highlight>
+                  <a:srgbClr val="FFFFFF"/>
+                </a:highlight>
+                <a:latin typeface="Ubuntu" panose="020B0504030602030204" pitchFamily="34" charset="0"/>
+              </a:rPr>
+              <a:t> can also detect deadlocks caused by owner locks (</a:t>
+            </a:r>
+            <a:r>
+              <a:rPr lang="en-IN" b="0" i="0" u="none" strike="noStrike" dirty="0" err="1">
+                <a:solidFill>
+                  <a:srgbClr val="212529"/>
+                </a:solidFill>
+                <a:effectLst/>
+                <a:highlight>
+                  <a:srgbClr val="FFFFFF"/>
+                </a:highlight>
+                <a:latin typeface="Ubuntu" panose="020B0504030602030204" pitchFamily="34" charset="0"/>
+              </a:rPr>
+              <a:t>java.util.concurrent</a:t>
+            </a:r>
+            <a:r>
+              <a:rPr lang="en-IN" b="0" i="0" u="none" strike="noStrike" dirty="0">
+                <a:solidFill>
+                  <a:srgbClr val="212529"/>
+                </a:solidFill>
+                <a:effectLst/>
+                <a:highlight>
+                  <a:srgbClr val="FFFFFF"/>
+                </a:highlight>
+                <a:latin typeface="Ubuntu" panose="020B0504030602030204" pitchFamily="34" charset="0"/>
+              </a:rPr>
+              <a:t>), while </a:t>
+            </a:r>
+            <a:r>
+              <a:rPr lang="en-IN" b="0" i="0" u="none" strike="noStrike" dirty="0" err="1">
+                <a:solidFill>
+                  <a:srgbClr val="212529"/>
+                </a:solidFill>
+                <a:effectLst/>
+                <a:highlight>
+                  <a:srgbClr val="FFFFFF"/>
+                </a:highlight>
+                <a:latin typeface="Ubuntu" panose="020B0504030602030204" pitchFamily="34" charset="0"/>
+              </a:rPr>
+              <a:t>findMonitorDeadlockedThreads</a:t>
+            </a:r>
+            <a:r>
+              <a:rPr lang="en-IN" b="0" i="0" u="none" strike="noStrike" dirty="0">
+                <a:solidFill>
+                  <a:srgbClr val="212529"/>
+                </a:solidFill>
+                <a:effectLst/>
+                <a:highlight>
+                  <a:srgbClr val="FFFFFF"/>
+                </a:highlight>
+                <a:latin typeface="Ubuntu" panose="020B0504030602030204" pitchFamily="34" charset="0"/>
+              </a:rPr>
+              <a:t> can only detect monitor locks (i.e. synchronized blocks).</a:t>
+            </a:r>
+            <a:endParaRPr lang="en-US" dirty="0"/>
+          </a:p>
+        </p:txBody>
+      </p:sp>
+    </p:spTree>
+    <p:extLst>
+      <p:ext uri="{BB962C8B-B14F-4D97-AF65-F5344CB8AC3E}">
+        <p14:creationId xmlns:p14="http://schemas.microsoft.com/office/powerpoint/2010/main" val="2385121351"/>
+      </p:ext>
+    </p:extLst>
+  </p:cSld>
+  <p:clrMapOvr>
+    <a:masterClrMapping/>
+  </p:clrMapOvr>
+</p:sld>
+</file>
+
+<file path=ppt/slides/slide209.xml><?xml version="1.0" encoding="utf-8"?>
+<p:sld xmlns:a="http://schemas.openxmlformats.org/drawingml/2006/main" xmlns:r="http://schemas.openxmlformats.org/officeDocument/2006/relationships" xmlns:p="http://schemas.openxmlformats.org/presentationml/2006/main">
+  <p:cSld>
+    <p:spTree>
+      <p:nvGrpSpPr>
+        <p:cNvPr id="1" name=""/>
+        <p:cNvGrpSpPr/>
+        <p:nvPr/>
+      </p:nvGrpSpPr>
+      <p:grpSpPr>
+        <a:xfrm>
+          <a:off x="0" y="0"/>
+          <a:ext cx="0" cy="0"/>
+          <a:chOff x="0" y="0"/>
+          <a:chExt cx="0" cy="0"/>
+        </a:xfrm>
+      </p:grpSpPr>
+      <p:sp>
+        <p:nvSpPr>
+          <p:cNvPr id="2" name="Title 1">
+            <a:extLst>
+              <a:ext uri="{FF2B5EF4-FFF2-40B4-BE49-F238E27FC236}">
+                <a16:creationId xmlns:a16="http://schemas.microsoft.com/office/drawing/2014/main" id="{CBC8062F-388F-8ED6-B541-2E74234DF0DB}"/>
+              </a:ext>
+            </a:extLst>
+          </p:cNvPr>
+          <p:cNvSpPr>
+            <a:spLocks noGrp="1"/>
+          </p:cNvSpPr>
+          <p:nvPr>
+            <p:ph type="title"/>
+          </p:nvPr>
+        </p:nvSpPr>
+        <p:spPr/>
+        <p:txBody>
+          <a:bodyPr/>
+          <a:lstStyle/>
+          <a:p>
+            <a:r>
+              <a:rPr lang="en-IN" b="0" i="0" u="none" strike="noStrike" dirty="0" err="1">
+                <a:solidFill>
+                  <a:srgbClr val="212529"/>
+                </a:solidFill>
+                <a:effectLst/>
+                <a:latin typeface="Ubuntu" panose="020B0504030602030204" pitchFamily="34" charset="0"/>
+              </a:rPr>
+              <a:t>ThreadLocal</a:t>
+            </a:r>
+            <a:endParaRPr lang="en-US" dirty="0"/>
+          </a:p>
+        </p:txBody>
+      </p:sp>
+      <p:sp>
+        <p:nvSpPr>
+          <p:cNvPr id="3" name="Content Placeholder 2">
+            <a:extLst>
+              <a:ext uri="{FF2B5EF4-FFF2-40B4-BE49-F238E27FC236}">
+                <a16:creationId xmlns:a16="http://schemas.microsoft.com/office/drawing/2014/main" id="{11301786-4E90-A5EE-5FCE-247A4E2C792C}"/>
+              </a:ext>
+            </a:extLst>
+          </p:cNvPr>
+          <p:cNvSpPr>
+            <a:spLocks noGrp="1"/>
+          </p:cNvSpPr>
+          <p:nvPr>
+            <p:ph idx="1"/>
+          </p:nvPr>
+        </p:nvSpPr>
+        <p:spPr/>
+        <p:txBody>
+          <a:bodyPr/>
+          <a:lstStyle/>
+          <a:p>
+            <a:r>
+              <a:rPr lang="en-IN" b="0" i="0" u="none" strike="noStrike" dirty="0">
+                <a:solidFill>
+                  <a:srgbClr val="212529"/>
+                </a:solidFill>
+                <a:effectLst/>
+                <a:highlight>
+                  <a:srgbClr val="FFFFFF"/>
+                </a:highlight>
+                <a:latin typeface="Ubuntu" panose="020B0504030602030204" pitchFamily="34" charset="0"/>
+              </a:rPr>
+              <a:t>The </a:t>
+            </a:r>
+            <a:r>
+              <a:rPr lang="en-IN" dirty="0" err="1"/>
+              <a:t>ThreadLocal</a:t>
+            </a:r>
+            <a:r>
+              <a:rPr lang="en-IN" b="0" i="0" u="none" strike="noStrike" dirty="0">
+                <a:solidFill>
+                  <a:srgbClr val="212529"/>
+                </a:solidFill>
+                <a:effectLst/>
+                <a:highlight>
+                  <a:srgbClr val="FFFFFF"/>
+                </a:highlight>
+                <a:latin typeface="Ubuntu" panose="020B0504030602030204" pitchFamily="34" charset="0"/>
+              </a:rPr>
+              <a:t> class in Java enables you to create variables that can only be read and written by the same thread. Thus, even if two threads are executing the same code, and the code has a reference to a </a:t>
+            </a:r>
+            <a:r>
+              <a:rPr lang="en-IN" b="0" i="0" u="none" strike="noStrike" dirty="0" err="1">
+                <a:solidFill>
+                  <a:srgbClr val="212529"/>
+                </a:solidFill>
+                <a:effectLst/>
+                <a:highlight>
+                  <a:srgbClr val="FFFFFF"/>
+                </a:highlight>
+                <a:latin typeface="Ubuntu" panose="020B0504030602030204" pitchFamily="34" charset="0"/>
+              </a:rPr>
+              <a:t>ThreadLocal</a:t>
+            </a:r>
+            <a:r>
+              <a:rPr lang="en-IN" b="0" i="0" u="none" strike="noStrike" dirty="0">
+                <a:solidFill>
+                  <a:srgbClr val="212529"/>
+                </a:solidFill>
+                <a:effectLst/>
+                <a:highlight>
+                  <a:srgbClr val="FFFFFF"/>
+                </a:highlight>
+                <a:latin typeface="Ubuntu" panose="020B0504030602030204" pitchFamily="34" charset="0"/>
+              </a:rPr>
+              <a:t> variable, then the two threads cannot see each other’s </a:t>
+            </a:r>
+            <a:r>
+              <a:rPr lang="en-IN" b="0" i="0" u="none" strike="noStrike" dirty="0" err="1">
+                <a:solidFill>
+                  <a:srgbClr val="212529"/>
+                </a:solidFill>
+                <a:effectLst/>
+                <a:highlight>
+                  <a:srgbClr val="FFFFFF"/>
+                </a:highlight>
+                <a:latin typeface="Ubuntu" panose="020B0504030602030204" pitchFamily="34" charset="0"/>
+              </a:rPr>
+              <a:t>ThreadLocal</a:t>
+            </a:r>
+            <a:r>
+              <a:rPr lang="en-IN" b="0" i="0" u="none" strike="noStrike" dirty="0">
+                <a:solidFill>
+                  <a:srgbClr val="212529"/>
+                </a:solidFill>
+                <a:effectLst/>
+                <a:highlight>
+                  <a:srgbClr val="FFFFFF"/>
+                </a:highlight>
+                <a:latin typeface="Ubuntu" panose="020B0504030602030204" pitchFamily="34" charset="0"/>
+              </a:rPr>
+              <a:t> variables.</a:t>
+            </a:r>
+            <a:endParaRPr lang="en-US" dirty="0"/>
+          </a:p>
+        </p:txBody>
+      </p:sp>
+    </p:spTree>
+    <p:extLst>
+      <p:ext uri="{BB962C8B-B14F-4D97-AF65-F5344CB8AC3E}">
+        <p14:creationId xmlns:p14="http://schemas.microsoft.com/office/powerpoint/2010/main" val="2183512638"/>
+      </p:ext>
+    </p:extLst>
+  </p:cSld>
+  <p:clrMapOvr>
+    <a:masterClrMapping/>
+  </p:clrMapOvr>
+</p:sld>
+</file>
+
 <file path=ppt/slides/slide21.xml><?xml version="1.0" encoding="utf-8"?>
 <p:sld xmlns:a="http://schemas.openxmlformats.org/drawingml/2006/main" xmlns:r="http://schemas.openxmlformats.org/officeDocument/2006/relationships" xmlns:p="http://schemas.openxmlformats.org/presentationml/2006/main">
   <p:cSld>

</xml_diff>

<commit_message>
Added new Notes 29 July 2024
</commit_message>
<xml_diff>
--- a/Notes/Core_Java.pptx
+++ b/Notes/Core_Java.pptx
@@ -23499,7 +23499,7 @@
                 <a:effectLst/>
                 <a:latin typeface="sohne"/>
               </a:rPr>
-              <a:t>By extending thread class</a:t>
+              <a:t>By extending Thread class</a:t>
             </a:r>
           </a:p>
           <a:p>
@@ -26403,27 +26403,7 @@
                 <a:effectLst/>
                 <a:latin typeface="source-serif-pro"/>
               </a:rPr>
-              <a:t> To ensure that changes made by one thread to a shared variable are visible to other threads, Java introduces the </a:t>
-            </a:r>
-            <a:r>
-              <a:rPr lang="en-IN" b="0" i="0" u="none" strike="noStrike" dirty="0" err="1">
-                <a:solidFill>
-                  <a:srgbClr val="242424"/>
-                </a:solidFill>
-                <a:effectLst/>
-                <a:latin typeface="source-serif-pro"/>
-              </a:rPr>
-              <a:t>volatilekeyword</a:t>
-            </a:r>
-            <a:r>
-              <a:rPr lang="en-IN" b="0" i="0" u="none" strike="noStrike" dirty="0">
-                <a:solidFill>
-                  <a:srgbClr val="242424"/>
-                </a:solidFill>
-                <a:effectLst/>
-                <a:latin typeface="source-serif-pro"/>
-              </a:rPr>
-              <a:t>. A volatile variable's value is always read from and written to the main memory, ensuring that every thread sees the latest value.</a:t>
+              <a:t> To ensure that changes made by one thread to a shared variable are visible to other threads, Java introduces the volatile keyword. A volatile variable's value is always read from and written to the main memory, ensuring that every thread sees the latest value.</a:t>
             </a:r>
           </a:p>
           <a:p>

</xml_diff>